<commit_message>
audio files and remote play
</commit_message>
<xml_diff>
--- a/Presentation1.pptx
+++ b/Presentation1.pptx
@@ -5,7 +5,7 @@
     <p:sldMasterId id="2147483648" r:id="rId1"/>
   </p:sldMasterIdLst>
   <p:notesMasterIdLst>
-    <p:notesMasterId r:id="rId13"/>
+    <p:notesMasterId r:id="rId14"/>
   </p:notesMasterIdLst>
   <p:sldIdLst>
     <p:sldId id="256" r:id="rId2"/>
@@ -19,6 +19,7 @@
     <p:sldId id="264" r:id="rId10"/>
     <p:sldId id="265" r:id="rId11"/>
     <p:sldId id="261" r:id="rId12"/>
+    <p:sldId id="268" r:id="rId13"/>
   </p:sldIdLst>
   <p:sldSz cx="12192000" cy="6858000"/>
   <p:notesSz cx="6858000" cy="9144000"/>
@@ -207,7 +208,7 @@
           <a:p>
             <a:fld id="{72646578-14F6-4B4C-9607-C52529FEB0BF}" type="datetimeFigureOut">
               <a:rPr lang="en-US" smtClean="0"/>
-              <a:t>11/27/23</a:t>
+              <a:t>11/28/23</a:t>
             </a:fld>
             <a:endParaRPr lang="en-US"/>
           </a:p>
@@ -1131,7 +1132,7 @@
           <a:p>
             <a:fld id="{78CD1D6E-A027-634F-BC83-5ADA8E496EAB}" type="datetimeFigureOut">
               <a:rPr lang="en-US" smtClean="0"/>
-              <a:t>11/27/23</a:t>
+              <a:t>11/28/23</a:t>
             </a:fld>
             <a:endParaRPr lang="en-US"/>
           </a:p>
@@ -1329,7 +1330,7 @@
           <a:p>
             <a:fld id="{78CD1D6E-A027-634F-BC83-5ADA8E496EAB}" type="datetimeFigureOut">
               <a:rPr lang="en-US" smtClean="0"/>
-              <a:t>11/27/23</a:t>
+              <a:t>11/28/23</a:t>
             </a:fld>
             <a:endParaRPr lang="en-US"/>
           </a:p>
@@ -1537,7 +1538,7 @@
           <a:p>
             <a:fld id="{78CD1D6E-A027-634F-BC83-5ADA8E496EAB}" type="datetimeFigureOut">
               <a:rPr lang="en-US" smtClean="0"/>
-              <a:t>11/27/23</a:t>
+              <a:t>11/28/23</a:t>
             </a:fld>
             <a:endParaRPr lang="en-US"/>
           </a:p>
@@ -1735,7 +1736,7 @@
           <a:p>
             <a:fld id="{78CD1D6E-A027-634F-BC83-5ADA8E496EAB}" type="datetimeFigureOut">
               <a:rPr lang="en-US" smtClean="0"/>
-              <a:t>11/27/23</a:t>
+              <a:t>11/28/23</a:t>
             </a:fld>
             <a:endParaRPr lang="en-US"/>
           </a:p>
@@ -2010,7 +2011,7 @@
           <a:p>
             <a:fld id="{78CD1D6E-A027-634F-BC83-5ADA8E496EAB}" type="datetimeFigureOut">
               <a:rPr lang="en-US" smtClean="0"/>
-              <a:t>11/27/23</a:t>
+              <a:t>11/28/23</a:t>
             </a:fld>
             <a:endParaRPr lang="en-US"/>
           </a:p>
@@ -2275,7 +2276,7 @@
           <a:p>
             <a:fld id="{78CD1D6E-A027-634F-BC83-5ADA8E496EAB}" type="datetimeFigureOut">
               <a:rPr lang="en-US" smtClean="0"/>
-              <a:t>11/27/23</a:t>
+              <a:t>11/28/23</a:t>
             </a:fld>
             <a:endParaRPr lang="en-US"/>
           </a:p>
@@ -2687,7 +2688,7 @@
           <a:p>
             <a:fld id="{78CD1D6E-A027-634F-BC83-5ADA8E496EAB}" type="datetimeFigureOut">
               <a:rPr lang="en-US" smtClean="0"/>
-              <a:t>11/27/23</a:t>
+              <a:t>11/28/23</a:t>
             </a:fld>
             <a:endParaRPr lang="en-US"/>
           </a:p>
@@ -2828,7 +2829,7 @@
           <a:p>
             <a:fld id="{78CD1D6E-A027-634F-BC83-5ADA8E496EAB}" type="datetimeFigureOut">
               <a:rPr lang="en-US" smtClean="0"/>
-              <a:t>11/27/23</a:t>
+              <a:t>11/28/23</a:t>
             </a:fld>
             <a:endParaRPr lang="en-US"/>
           </a:p>
@@ -2941,7 +2942,7 @@
           <a:p>
             <a:fld id="{78CD1D6E-A027-634F-BC83-5ADA8E496EAB}" type="datetimeFigureOut">
               <a:rPr lang="en-US" smtClean="0"/>
-              <a:t>11/27/23</a:t>
+              <a:t>11/28/23</a:t>
             </a:fld>
             <a:endParaRPr lang="en-US"/>
           </a:p>
@@ -3252,7 +3253,7 @@
           <a:p>
             <a:fld id="{78CD1D6E-A027-634F-BC83-5ADA8E496EAB}" type="datetimeFigureOut">
               <a:rPr lang="en-US" smtClean="0"/>
-              <a:t>11/27/23</a:t>
+              <a:t>11/28/23</a:t>
             </a:fld>
             <a:endParaRPr lang="en-US"/>
           </a:p>
@@ -3540,7 +3541,7 @@
           <a:p>
             <a:fld id="{78CD1D6E-A027-634F-BC83-5ADA8E496EAB}" type="datetimeFigureOut">
               <a:rPr lang="en-US" smtClean="0"/>
-              <a:t>11/27/23</a:t>
+              <a:t>11/28/23</a:t>
             </a:fld>
             <a:endParaRPr lang="en-US"/>
           </a:p>
@@ -3781,7 +3782,7 @@
           <a:p>
             <a:fld id="{78CD1D6E-A027-634F-BC83-5ADA8E496EAB}" type="datetimeFigureOut">
               <a:rPr lang="en-US" smtClean="0"/>
-              <a:t>11/27/23</a:t>
+              <a:t>11/28/23</a:t>
             </a:fld>
             <a:endParaRPr lang="en-US"/>
           </a:p>
@@ -4376,7 +4377,19 @@
             </a:r>
             <a:r>
               <a:rPr lang="en-US" altLang="zh-CN" b="1" dirty="0"/>
-              <a:t>Data:</a:t>
+              <a:t>Data(</a:t>
+            </a:r>
+            <a:r>
+              <a:rPr lang="en-US" altLang="zh-CN" b="1" dirty="0">
+                <a:solidFill>
+                  <a:srgbClr val="FF0000"/>
+                </a:solidFill>
+              </a:rPr>
+              <a:t>C</a:t>
+            </a:r>
+            <a:r>
+              <a:rPr lang="en-US" altLang="zh-CN" b="1" dirty="0"/>
+              <a:t>):</a:t>
             </a:r>
             <a:r>
               <a:rPr lang="zh-CN" altLang="en-US" b="1" dirty="0"/>
@@ -4454,7 +4467,19 @@
             </a:r>
             <a:r>
               <a:rPr lang="en-US" altLang="zh-CN" b="1" dirty="0"/>
-              <a:t>Files:</a:t>
+              <a:t>Files(</a:t>
+            </a:r>
+            <a:r>
+              <a:rPr lang="en-US" altLang="zh-CN" b="1" dirty="0">
+                <a:solidFill>
+                  <a:srgbClr val="FF0000"/>
+                </a:solidFill>
+              </a:rPr>
+              <a:t>A</a:t>
+            </a:r>
+            <a:r>
+              <a:rPr lang="en-US" altLang="zh-CN" b="1" dirty="0"/>
+              <a:t>):</a:t>
             </a:r>
             <a:r>
               <a:rPr lang="zh-CN" altLang="en-US" b="1" dirty="0"/>
@@ -4540,7 +4565,19 @@
             </a:r>
             <a:r>
               <a:rPr lang="en-US" altLang="zh-CN" b="1" dirty="0"/>
-              <a:t>Data:</a:t>
+              <a:t>Data(</a:t>
+            </a:r>
+            <a:r>
+              <a:rPr lang="en-US" altLang="zh-CN" b="1" dirty="0">
+                <a:solidFill>
+                  <a:srgbClr val="FF0000"/>
+                </a:solidFill>
+              </a:rPr>
+              <a:t>W</a:t>
+            </a:r>
+            <a:r>
+              <a:rPr lang="en-US" altLang="zh-CN" b="1" dirty="0"/>
+              <a:t>):</a:t>
             </a:r>
             <a:r>
               <a:rPr lang="zh-CN" altLang="en-US" b="1" dirty="0"/>
@@ -5255,6 +5292,116 @@
 </p:sld>
 </file>
 
+<file path=ppt/slides/slide12.xml><?xml version="1.0" encoding="utf-8"?>
+<p:sld xmlns:a="http://schemas.openxmlformats.org/drawingml/2006/main" xmlns:r="http://schemas.openxmlformats.org/officeDocument/2006/relationships" xmlns:p="http://schemas.openxmlformats.org/presentationml/2006/main">
+  <p:cSld>
+    <p:spTree>
+      <p:nvGrpSpPr>
+        <p:cNvPr id="1" name=""/>
+        <p:cNvGrpSpPr/>
+        <p:nvPr/>
+      </p:nvGrpSpPr>
+      <p:grpSpPr>
+        <a:xfrm>
+          <a:off x="0" y="0"/>
+          <a:ext cx="0" cy="0"/>
+          <a:chOff x="0" y="0"/>
+          <a:chExt cx="0" cy="0"/>
+        </a:xfrm>
+      </p:grpSpPr>
+      <p:sp>
+        <p:nvSpPr>
+          <p:cNvPr id="2" name="Title 1">
+            <a:extLst>
+              <a:ext uri="{FF2B5EF4-FFF2-40B4-BE49-F238E27FC236}">
+                <a16:creationId xmlns:a16="http://schemas.microsoft.com/office/drawing/2014/main" id="{F6F1EF8D-EF5C-5793-3E60-018150240903}"/>
+              </a:ext>
+            </a:extLst>
+          </p:cNvPr>
+          <p:cNvSpPr>
+            <a:spLocks noGrp="1"/>
+          </p:cNvSpPr>
+          <p:nvPr>
+            <p:ph type="title"/>
+          </p:nvPr>
+        </p:nvSpPr>
+        <p:spPr/>
+        <p:txBody>
+          <a:bodyPr/>
+          <a:lstStyle/>
+          <a:p>
+            <a:endParaRPr lang="en-US"/>
+          </a:p>
+        </p:txBody>
+      </p:sp>
+      <p:sp>
+        <p:nvSpPr>
+          <p:cNvPr id="3" name="Content Placeholder 2">
+            <a:extLst>
+              <a:ext uri="{FF2B5EF4-FFF2-40B4-BE49-F238E27FC236}">
+                <a16:creationId xmlns:a16="http://schemas.microsoft.com/office/drawing/2014/main" id="{6DA27256-6C48-C4F3-0AA7-2923F1C403E3}"/>
+              </a:ext>
+            </a:extLst>
+          </p:cNvPr>
+          <p:cNvSpPr>
+            <a:spLocks noGrp="1"/>
+          </p:cNvSpPr>
+          <p:nvPr>
+            <p:ph idx="1"/>
+          </p:nvPr>
+        </p:nvSpPr>
+        <p:spPr/>
+        <p:txBody>
+          <a:bodyPr/>
+          <a:lstStyle/>
+          <a:p>
+            <a:endParaRPr lang="en-US"/>
+          </a:p>
+        </p:txBody>
+      </p:sp>
+      <p:pic>
+        <p:nvPicPr>
+          <p:cNvPr id="4" name="Picture 3">
+            <a:extLst>
+              <a:ext uri="{FF2B5EF4-FFF2-40B4-BE49-F238E27FC236}">
+                <a16:creationId xmlns:a16="http://schemas.microsoft.com/office/drawing/2014/main" id="{D9652C1F-34A3-5C0E-57D4-033D189F3571}"/>
+              </a:ext>
+            </a:extLst>
+          </p:cNvPr>
+          <p:cNvPicPr>
+            <a:picLocks noChangeAspect="1"/>
+          </p:cNvPicPr>
+          <p:nvPr/>
+        </p:nvPicPr>
+        <p:blipFill>
+          <a:blip r:embed="rId2"/>
+          <a:stretch>
+            <a:fillRect/>
+          </a:stretch>
+        </p:blipFill>
+        <p:spPr>
+          <a:xfrm>
+            <a:off x="1176458" y="1156139"/>
+            <a:ext cx="9599674" cy="4873680"/>
+          </a:xfrm>
+          <a:prstGeom prst="rect">
+            <a:avLst/>
+          </a:prstGeom>
+        </p:spPr>
+      </p:pic>
+    </p:spTree>
+    <p:extLst>
+      <p:ext uri="{BB962C8B-B14F-4D97-AF65-F5344CB8AC3E}">
+        <p14:creationId xmlns:p14="http://schemas.microsoft.com/office/powerpoint/2010/main" val="751806766"/>
+      </p:ext>
+    </p:extLst>
+  </p:cSld>
+  <p:clrMapOvr>
+    <a:masterClrMapping/>
+  </p:clrMapOvr>
+</p:sld>
+</file>
+
 <file path=ppt/slides/slide2.xml><?xml version="1.0" encoding="utf-8"?>
 <p:sld xmlns:a="http://schemas.openxmlformats.org/drawingml/2006/main" xmlns:r="http://schemas.openxmlformats.org/officeDocument/2006/relationships" xmlns:p="http://schemas.openxmlformats.org/presentationml/2006/main">
   <p:cSld>
@@ -7603,6 +7750,26 @@
               <a:rPr lang="en-US" altLang="zh-CN" dirty="0"/>
               <a:t>time</a:t>
             </a:r>
+            <a:r>
+              <a:rPr lang="zh-CN" altLang="en-US" dirty="0"/>
+              <a:t> </a:t>
+            </a:r>
+            <a:r>
+              <a:rPr lang="en-US" altLang="zh-CN" dirty="0"/>
+              <a:t>on</a:t>
+            </a:r>
+            <a:r>
+              <a:rPr lang="zh-CN" altLang="en-US" dirty="0"/>
+              <a:t> </a:t>
+            </a:r>
+            <a:r>
+              <a:rPr lang="en-US" altLang="zh-CN" dirty="0">
+                <a:solidFill>
+                  <a:srgbClr val="0070C0"/>
+                </a:solidFill>
+              </a:rPr>
+              <a:t>Pi</a:t>
+            </a:r>
           </a:p>
           <a:p>
             <a:r>
@@ -7623,11 +7790,7 @@
             </a:r>
             <a:r>
               <a:rPr lang="en-US" altLang="zh-CN" b="1" dirty="0"/>
-              <a:t>collection:</a:t>
-            </a:r>
-            <a:r>
-              <a:rPr lang="zh-CN" altLang="en-US" b="1" dirty="0"/>
-              <a:t> </a:t>
+              <a:t>collection</a:t>
             </a:r>
             <a:r>
               <a:rPr lang="en-US" altLang="zh-CN" dirty="0"/>
@@ -7646,87 +7809,23 @@
               <a:t>)</a:t>
             </a:r>
             <a:r>
-              <a:rPr lang="zh-CN" altLang="en-US" dirty="0"/>
-              <a:t> </a:t>
-            </a:r>
-            <a:r>
-              <a:rPr lang="en-US" altLang="zh-CN" dirty="0"/>
-              <a:t>Sync</a:t>
-            </a:r>
-            <a:r>
-              <a:rPr lang="zh-CN" altLang="en-US" dirty="0"/>
-              <a:t> </a:t>
-            </a:r>
-            <a:r>
-              <a:rPr lang="en-US" altLang="zh-CN" dirty="0"/>
-              <a:t>Pi</a:t>
-            </a:r>
-            <a:r>
-              <a:rPr lang="zh-CN" altLang="en-US" dirty="0"/>
-              <a:t> </a:t>
-            </a:r>
-            <a:r>
-              <a:rPr lang="en-US" altLang="zh-CN" dirty="0"/>
-              <a:t>-&gt;</a:t>
-            </a:r>
-            <a:r>
-              <a:rPr lang="zh-CN" altLang="en-US" dirty="0"/>
-              <a:t> </a:t>
-            </a:r>
-            <a:r>
-              <a:rPr lang="en-US" altLang="zh-CN" dirty="0"/>
-              <a:t>PC</a:t>
-            </a:r>
-            <a:r>
-              <a:rPr lang="zh-CN" altLang="en-US" dirty="0"/>
-              <a:t> </a:t>
-            </a:r>
-            <a:r>
-              <a:rPr lang="en-US" altLang="zh-CN" dirty="0"/>
-              <a:t>(SSH</a:t>
-            </a:r>
-            <a:r>
-              <a:rPr lang="zh-CN" altLang="en-US" dirty="0"/>
-              <a:t> </a:t>
-            </a:r>
-            <a:r>
-              <a:rPr lang="en-US" altLang="zh-CN" dirty="0"/>
-              <a:t>or</a:t>
-            </a:r>
-            <a:r>
-              <a:rPr lang="zh-CN" altLang="en-US" dirty="0"/>
-              <a:t> </a:t>
-            </a:r>
-            <a:r>
-              <a:rPr lang="en-US" altLang="zh-CN" dirty="0"/>
-              <a:t>a</a:t>
-            </a:r>
-            <a:r>
-              <a:rPr lang="zh-CN" altLang="en-US" dirty="0"/>
-              <a:t> </a:t>
-            </a:r>
-            <a:r>
-              <a:rPr lang="en-US" altLang="zh-CN" dirty="0"/>
-              <a:t>local</a:t>
-            </a:r>
-            <a:r>
-              <a:rPr lang="zh-CN" altLang="en-US" dirty="0"/>
-              <a:t> </a:t>
-            </a:r>
-            <a:r>
-              <a:rPr lang="en-US" altLang="zh-CN" dirty="0"/>
-              <a:t>network</a:t>
-            </a:r>
-            <a:r>
-              <a:rPr lang="zh-CN" altLang="en-US" dirty="0"/>
-              <a:t> </a:t>
-            </a:r>
-            <a:r>
-              <a:rPr lang="en-US" altLang="zh-CN" dirty="0"/>
-              <a:t>API)</a:t>
-            </a:r>
-          </a:p>
-          <a:p>
+              <a:rPr lang="en-US" altLang="zh-CN" b="1" dirty="0"/>
+              <a:t>:</a:t>
+            </a:r>
+            <a:r>
+              <a:rPr lang="zh-CN" altLang="en-US" b="1" dirty="0"/>
+              <a:t> </a:t>
+            </a:r>
+            <a:r>
+              <a:rPr lang="en-US" altLang="zh-CN" dirty="0"/>
+              <a:t>R</a:t>
+            </a:r>
+            <a:r>
+              <a:rPr lang="en-US" b="0" i="0" dirty="0">
+                <a:effectLst/>
+              </a:rPr>
+              <a:t>ecord the traffic data at the same time.</a:t>
+            </a:r>
             <a:endParaRPr lang="en-US" altLang="zh-CN" dirty="0"/>
           </a:p>
           <a:p>

</xml_diff>